<commit_message>
Setting up new heuristic
</commit_message>
<xml_diff>
--- a/docs/paper/figs/Diagrams.pptx
+++ b/docs/paper/figs/Diagrams.pptx
@@ -292,7 +292,7 @@
             <a:fld id="{1D8BD707-D9CF-40AE-B4C6-C98DA3205C09}" type="datetimeFigureOut">
               <a:rPr lang="en-US" smtClean="0"/>
               <a:pPr/>
-              <a:t>4/20/2019</a:t>
+              <a:t>5/5/2019</a:t>
             </a:fld>
             <a:endParaRPr lang="en-US"/>
           </a:p>
@@ -459,7 +459,7 @@
             <a:fld id="{1D8BD707-D9CF-40AE-B4C6-C98DA3205C09}" type="datetimeFigureOut">
               <a:rPr lang="en-US" smtClean="0"/>
               <a:pPr/>
-              <a:t>4/20/2019</a:t>
+              <a:t>5/5/2019</a:t>
             </a:fld>
             <a:endParaRPr lang="en-US"/>
           </a:p>
@@ -636,7 +636,7 @@
             <a:fld id="{1D8BD707-D9CF-40AE-B4C6-C98DA3205C09}" type="datetimeFigureOut">
               <a:rPr lang="en-US" smtClean="0"/>
               <a:pPr/>
-              <a:t>4/20/2019</a:t>
+              <a:t>5/5/2019</a:t>
             </a:fld>
             <a:endParaRPr lang="en-US"/>
           </a:p>
@@ -803,7 +803,7 @@
             <a:fld id="{1D8BD707-D9CF-40AE-B4C6-C98DA3205C09}" type="datetimeFigureOut">
               <a:rPr lang="en-US" smtClean="0"/>
               <a:pPr/>
-              <a:t>4/20/2019</a:t>
+              <a:t>5/5/2019</a:t>
             </a:fld>
             <a:endParaRPr lang="en-US"/>
           </a:p>
@@ -1046,7 +1046,7 @@
             <a:fld id="{1D8BD707-D9CF-40AE-B4C6-C98DA3205C09}" type="datetimeFigureOut">
               <a:rPr lang="en-US" smtClean="0"/>
               <a:pPr/>
-              <a:t>4/20/2019</a:t>
+              <a:t>5/5/2019</a:t>
             </a:fld>
             <a:endParaRPr lang="en-US"/>
           </a:p>
@@ -1331,7 +1331,7 @@
             <a:fld id="{1D8BD707-D9CF-40AE-B4C6-C98DA3205C09}" type="datetimeFigureOut">
               <a:rPr lang="en-US" smtClean="0"/>
               <a:pPr/>
-              <a:t>4/20/2019</a:t>
+              <a:t>5/5/2019</a:t>
             </a:fld>
             <a:endParaRPr lang="en-US"/>
           </a:p>
@@ -1750,7 +1750,7 @@
             <a:fld id="{1D8BD707-D9CF-40AE-B4C6-C98DA3205C09}" type="datetimeFigureOut">
               <a:rPr lang="en-US" smtClean="0"/>
               <a:pPr/>
-              <a:t>4/20/2019</a:t>
+              <a:t>5/5/2019</a:t>
             </a:fld>
             <a:endParaRPr lang="en-US"/>
           </a:p>
@@ -1865,7 +1865,7 @@
             <a:fld id="{1D8BD707-D9CF-40AE-B4C6-C98DA3205C09}" type="datetimeFigureOut">
               <a:rPr lang="en-US" smtClean="0"/>
               <a:pPr/>
-              <a:t>4/20/2019</a:t>
+              <a:t>5/5/2019</a:t>
             </a:fld>
             <a:endParaRPr lang="en-US"/>
           </a:p>
@@ -1957,7 +1957,7 @@
             <a:fld id="{1D8BD707-D9CF-40AE-B4C6-C98DA3205C09}" type="datetimeFigureOut">
               <a:rPr lang="en-US" smtClean="0"/>
               <a:pPr/>
-              <a:t>4/20/2019</a:t>
+              <a:t>5/5/2019</a:t>
             </a:fld>
             <a:endParaRPr lang="en-US"/>
           </a:p>
@@ -2231,7 +2231,7 @@
             <a:fld id="{1D8BD707-D9CF-40AE-B4C6-C98DA3205C09}" type="datetimeFigureOut">
               <a:rPr lang="en-US" smtClean="0"/>
               <a:pPr/>
-              <a:t>4/20/2019</a:t>
+              <a:t>5/5/2019</a:t>
             </a:fld>
             <a:endParaRPr lang="en-US"/>
           </a:p>
@@ -2481,7 +2481,7 @@
             <a:fld id="{1D8BD707-D9CF-40AE-B4C6-C98DA3205C09}" type="datetimeFigureOut">
               <a:rPr lang="en-US" smtClean="0"/>
               <a:pPr/>
-              <a:t>4/20/2019</a:t>
+              <a:t>5/5/2019</a:t>
             </a:fld>
             <a:endParaRPr lang="en-US"/>
           </a:p>
@@ -2691,7 +2691,7 @@
             <a:fld id="{1D8BD707-D9CF-40AE-B4C6-C98DA3205C09}" type="datetimeFigureOut">
               <a:rPr lang="en-US" smtClean="0"/>
               <a:pPr/>
-              <a:t>4/20/2019</a:t>
+              <a:t>5/5/2019</a:t>
             </a:fld>
             <a:endParaRPr lang="en-US"/>
           </a:p>
@@ -3207,27 +3207,7 @@
                 <a:latin typeface="Times New Roman" pitchFamily="18" charset="0"/>
                 <a:cs typeface="Times New Roman" pitchFamily="18" charset="0"/>
               </a:rPr>
-              <a:t> </a:t>
-            </a:r>
-            <a:r>
-              <a:rPr lang="en-US" sz="1100" dirty="0" smtClean="0">
-                <a:solidFill>
-                  <a:sysClr val="windowText" lastClr="000000"/>
-                </a:solidFill>
-                <a:latin typeface="Times New Roman" pitchFamily="18" charset="0"/>
-                <a:cs typeface="Times New Roman" pitchFamily="18" charset="0"/>
-              </a:rPr>
-              <a:t>Flight </a:t>
-            </a:r>
-            <a:r>
-              <a:rPr lang="en-US" sz="1100" dirty="0" smtClean="0">
-                <a:solidFill>
-                  <a:sysClr val="windowText" lastClr="000000"/>
-                </a:solidFill>
-                <a:latin typeface="Times New Roman" pitchFamily="18" charset="0"/>
-                <a:cs typeface="Times New Roman" pitchFamily="18" charset="0"/>
-              </a:rPr>
-              <a:t>Manifests</a:t>
+              <a:t> Flight Manifests</a:t>
             </a:r>
           </a:p>
         </p:txBody>
@@ -3320,13 +3300,6 @@
               </a:rPr>
               <a:t> Simulated Objects</a:t>
             </a:r>
-            <a:endParaRPr lang="en-US" sz="1100" dirty="0" smtClean="0">
-              <a:solidFill>
-                <a:sysClr val="windowText" lastClr="000000"/>
-              </a:solidFill>
-              <a:latin typeface="Times New Roman" pitchFamily="18" charset="0"/>
-              <a:cs typeface="Times New Roman" pitchFamily="18" charset="0"/>
-            </a:endParaRPr>
           </a:p>
           <a:p>
             <a:pPr>
@@ -3341,25 +3314,8 @@
                 <a:latin typeface="Times New Roman" pitchFamily="18" charset="0"/>
                 <a:cs typeface="Times New Roman" pitchFamily="18" charset="0"/>
               </a:rPr>
-              <a:t> </a:t>
-            </a:r>
-            <a:r>
-              <a:rPr lang="en-US" sz="1100" dirty="0" smtClean="0">
-                <a:solidFill>
-                  <a:sysClr val="windowText" lastClr="000000"/>
-                </a:solidFill>
-                <a:latin typeface="Times New Roman" pitchFamily="18" charset="0"/>
-                <a:cs typeface="Times New Roman" pitchFamily="18" charset="0"/>
-              </a:rPr>
-              <a:t>Object Paths</a:t>
-            </a:r>
-            <a:endParaRPr lang="en-US" sz="1100" dirty="0" smtClean="0">
-              <a:solidFill>
-                <a:sysClr val="windowText" lastClr="000000"/>
-              </a:solidFill>
-              <a:latin typeface="Times New Roman" pitchFamily="18" charset="0"/>
-              <a:cs typeface="Times New Roman" pitchFamily="18" charset="0"/>
-            </a:endParaRPr>
+              <a:t> Object Paths</a:t>
+            </a:r>
           </a:p>
         </p:txBody>
       </p:sp>
@@ -3433,8 +3389,14 @@
                 <a:latin typeface="Times New Roman" pitchFamily="18" charset="0"/>
                 <a:cs typeface="Times New Roman" pitchFamily="18" charset="0"/>
               </a:rPr>
-              <a:t> </a:t>
-            </a:r>
+              <a:t> Simulated Objects</a:t>
+            </a:r>
+          </a:p>
+          <a:p>
+            <a:pPr>
+              <a:buFont typeface="Arial" pitchFamily="34" charset="0"/>
+              <a:buChar char="•"/>
+            </a:pPr>
             <a:r>
               <a:rPr lang="en-US" sz="1100" dirty="0" smtClean="0">
                 <a:solidFill>
@@ -3443,48 +3405,8 @@
                 <a:latin typeface="Times New Roman" pitchFamily="18" charset="0"/>
                 <a:cs typeface="Times New Roman" pitchFamily="18" charset="0"/>
               </a:rPr>
-              <a:t>Simulated Objects</a:t>
-            </a:r>
-            <a:endParaRPr lang="en-US" sz="1100" dirty="0" smtClean="0">
-              <a:solidFill>
-                <a:sysClr val="windowText" lastClr="000000"/>
-              </a:solidFill>
-              <a:latin typeface="Times New Roman" pitchFamily="18" charset="0"/>
-              <a:cs typeface="Times New Roman" pitchFamily="18" charset="0"/>
-            </a:endParaRPr>
-          </a:p>
-          <a:p>
-            <a:pPr>
-              <a:buFont typeface="Arial" pitchFamily="34" charset="0"/>
-              <a:buChar char="•"/>
-            </a:pPr>
-            <a:r>
-              <a:rPr lang="en-US" sz="1100" dirty="0" smtClean="0">
-                <a:solidFill>
-                  <a:sysClr val="windowText" lastClr="000000"/>
-                </a:solidFill>
-                <a:latin typeface="Times New Roman" pitchFamily="18" charset="0"/>
-                <a:cs typeface="Times New Roman" pitchFamily="18" charset="0"/>
-              </a:rPr>
-              <a:t> </a:t>
-            </a:r>
-            <a:r>
-              <a:rPr lang="en-US" sz="1100" dirty="0" smtClean="0">
-                <a:solidFill>
-                  <a:sysClr val="windowText" lastClr="000000"/>
-                </a:solidFill>
-                <a:latin typeface="Times New Roman" pitchFamily="18" charset="0"/>
-                <a:cs typeface="Times New Roman" pitchFamily="18" charset="0"/>
-              </a:rPr>
-              <a:t>Object Paths</a:t>
-            </a:r>
-            <a:endParaRPr lang="en-US" sz="1100" dirty="0" smtClean="0">
-              <a:solidFill>
-                <a:sysClr val="windowText" lastClr="000000"/>
-              </a:solidFill>
-              <a:latin typeface="Times New Roman" pitchFamily="18" charset="0"/>
-              <a:cs typeface="Times New Roman" pitchFamily="18" charset="0"/>
-            </a:endParaRPr>
+              <a:t> Object Paths</a:t>
+            </a:r>
           </a:p>
         </p:txBody>
       </p:sp>
@@ -3545,13 +3467,6 @@
               </a:rPr>
               <a:t>Input Environment</a:t>
             </a:r>
-            <a:endParaRPr lang="en-US" sz="1400" dirty="0" smtClean="0">
-              <a:solidFill>
-                <a:sysClr val="windowText" lastClr="000000"/>
-              </a:solidFill>
-              <a:latin typeface="Times New Roman" pitchFamily="18" charset="0"/>
-              <a:cs typeface="Times New Roman" pitchFamily="18" charset="0"/>
-            </a:endParaRPr>
           </a:p>
         </p:txBody>
       </p:sp>
@@ -3612,13 +3527,6 @@
               </a:rPr>
               <a:t>Input Simulated Objects</a:t>
             </a:r>
-            <a:endParaRPr lang="en-US" sz="1400" dirty="0" smtClean="0">
-              <a:solidFill>
-                <a:sysClr val="windowText" lastClr="000000"/>
-              </a:solidFill>
-              <a:latin typeface="Times New Roman" pitchFamily="18" charset="0"/>
-              <a:cs typeface="Times New Roman" pitchFamily="18" charset="0"/>
-            </a:endParaRPr>
           </a:p>
         </p:txBody>
       </p:sp>
@@ -3679,13 +3587,6 @@
               </a:rPr>
               <a:t>Input Settings and Preview</a:t>
             </a:r>
-            <a:endParaRPr lang="en-US" sz="1400" dirty="0" smtClean="0">
-              <a:solidFill>
-                <a:sysClr val="windowText" lastClr="000000"/>
-              </a:solidFill>
-              <a:latin typeface="Times New Roman" pitchFamily="18" charset="0"/>
-              <a:cs typeface="Times New Roman" pitchFamily="18" charset="0"/>
-            </a:endParaRPr>
           </a:p>
         </p:txBody>
       </p:sp>
@@ -3746,13 +3647,6 @@
               </a:rPr>
               <a:t>Execute Algorithm</a:t>
             </a:r>
-            <a:endParaRPr lang="en-US" sz="1400" dirty="0" smtClean="0">
-              <a:solidFill>
-                <a:sysClr val="windowText" lastClr="000000"/>
-              </a:solidFill>
-              <a:latin typeface="Times New Roman" pitchFamily="18" charset="0"/>
-              <a:cs typeface="Times New Roman" pitchFamily="18" charset="0"/>
-            </a:endParaRPr>
           </a:p>
         </p:txBody>
       </p:sp>
@@ -3813,13 +3707,6 @@
               </a:rPr>
               <a:t>View Results</a:t>
             </a:r>
-            <a:endParaRPr lang="en-US" sz="1400" dirty="0" smtClean="0">
-              <a:solidFill>
-                <a:sysClr val="windowText" lastClr="000000"/>
-              </a:solidFill>
-              <a:latin typeface="Times New Roman" pitchFamily="18" charset="0"/>
-              <a:cs typeface="Times New Roman" pitchFamily="18" charset="0"/>
-            </a:endParaRPr>
           </a:p>
         </p:txBody>
       </p:sp>
@@ -3894,17 +3781,7 @@
                   <a:latin typeface="Times New Roman" pitchFamily="18" charset="0"/>
                   <a:cs typeface="Times New Roman" pitchFamily="18" charset="0"/>
                 </a:rPr>
-                <a:t>User </a:t>
-              </a:r>
-              <a:r>
-                <a:rPr lang="en-US" sz="1400" dirty="0" smtClean="0">
-                  <a:solidFill>
-                    <a:sysClr val="windowText" lastClr="000000"/>
-                  </a:solidFill>
-                  <a:latin typeface="Times New Roman" pitchFamily="18" charset="0"/>
-                  <a:cs typeface="Times New Roman" pitchFamily="18" charset="0"/>
-                </a:rPr>
-                <a:t>Workflow</a:t>
+                <a:t>User Workflow</a:t>
               </a:r>
             </a:p>
             <a:p>
@@ -3923,13 +3800,6 @@
                 </a:rPr>
                 <a:t>Dataflow</a:t>
               </a:r>
-              <a:endParaRPr lang="en-US" sz="1400" dirty="0" smtClean="0">
-                <a:solidFill>
-                  <a:sysClr val="windowText" lastClr="000000"/>
-                </a:solidFill>
-                <a:latin typeface="Times New Roman" pitchFamily="18" charset="0"/>
-                <a:cs typeface="Times New Roman" pitchFamily="18" charset="0"/>
-              </a:endParaRPr>
             </a:p>
           </p:txBody>
         </p:sp>
@@ -4407,13 +4277,6 @@
               </a:rPr>
               <a:t>Pre-execution Preview Plot</a:t>
             </a:r>
-            <a:endParaRPr lang="en-US" sz="1400" dirty="0" smtClean="0">
-              <a:solidFill>
-                <a:schemeClr val="tx1"/>
-              </a:solidFill>
-              <a:latin typeface="Times New Roman" pitchFamily="18" charset="0"/>
-              <a:cs typeface="Times New Roman" pitchFamily="18" charset="0"/>
-            </a:endParaRPr>
           </a:p>
         </p:txBody>
       </p:sp>
@@ -4844,13 +4707,6 @@
               </a:rPr>
               <a:t>Algorithm 3-D Visualization</a:t>
             </a:r>
-            <a:endParaRPr lang="en-US" sz="1400" dirty="0" smtClean="0">
-              <a:solidFill>
-                <a:schemeClr val="tx1"/>
-              </a:solidFill>
-              <a:latin typeface="Times New Roman" pitchFamily="18" charset="0"/>
-              <a:cs typeface="Times New Roman" pitchFamily="18" charset="0"/>
-            </a:endParaRPr>
           </a:p>
         </p:txBody>
       </p:sp>
@@ -4952,13 +4808,6 @@
               </a:rPr>
               <a:t>Iteration History Plots</a:t>
             </a:r>
-            <a:endParaRPr lang="en-US" sz="1400" dirty="0" smtClean="0">
-              <a:solidFill>
-                <a:schemeClr val="tx1"/>
-              </a:solidFill>
-              <a:latin typeface="Times New Roman" pitchFamily="18" charset="0"/>
-              <a:cs typeface="Times New Roman" pitchFamily="18" charset="0"/>
-            </a:endParaRPr>
           </a:p>
         </p:txBody>
       </p:sp>
@@ -5202,8 +5051,14 @@
                 <a:latin typeface="Times New Roman" pitchFamily="18" charset="0"/>
                 <a:cs typeface="Times New Roman" pitchFamily="18" charset="0"/>
               </a:rPr>
-              <a:t> </a:t>
-            </a:r>
+              <a:t> Generates Results</a:t>
+            </a:r>
+          </a:p>
+          <a:p>
+            <a:pPr>
+              <a:buFont typeface="Arial" pitchFamily="34" charset="0"/>
+              <a:buChar char="•"/>
+            </a:pPr>
             <a:r>
               <a:rPr lang="en-US" sz="1100" dirty="0" smtClean="0">
                 <a:solidFill>
@@ -5212,40 +5067,7 @@
                 <a:latin typeface="Times New Roman" pitchFamily="18" charset="0"/>
                 <a:cs typeface="Times New Roman" pitchFamily="18" charset="0"/>
               </a:rPr>
-              <a:t>Generates Results</a:t>
-            </a:r>
-            <a:endParaRPr lang="en-US" sz="1100" dirty="0" smtClean="0">
-              <a:solidFill>
-                <a:sysClr val="windowText" lastClr="000000"/>
-              </a:solidFill>
-              <a:latin typeface="Times New Roman" pitchFamily="18" charset="0"/>
-              <a:cs typeface="Times New Roman" pitchFamily="18" charset="0"/>
-            </a:endParaRPr>
-          </a:p>
-          <a:p>
-            <a:pPr>
-              <a:buFont typeface="Arial" pitchFamily="34" charset="0"/>
-              <a:buChar char="•"/>
-            </a:pPr>
-            <a:r>
-              <a:rPr lang="en-US" sz="1100" dirty="0" smtClean="0">
-                <a:solidFill>
-                  <a:sysClr val="windowText" lastClr="000000"/>
-                </a:solidFill>
-                <a:latin typeface="Times New Roman" pitchFamily="18" charset="0"/>
-                <a:cs typeface="Times New Roman" pitchFamily="18" charset="0"/>
-              </a:rPr>
-              <a:t> </a:t>
-            </a:r>
-            <a:r>
-              <a:rPr lang="en-US" sz="1100" dirty="0" smtClean="0">
-                <a:solidFill>
-                  <a:sysClr val="windowText" lastClr="000000"/>
-                </a:solidFill>
-                <a:latin typeface="Times New Roman" pitchFamily="18" charset="0"/>
-                <a:cs typeface="Times New Roman" pitchFamily="18" charset="0"/>
-              </a:rPr>
-              <a:t>Uses Path Data</a:t>
+              <a:t> Uses Path Data</a:t>
             </a:r>
             <a:endParaRPr lang="en-US" sz="1400" dirty="0" smtClean="0">
               <a:solidFill>
@@ -5339,13 +5161,6 @@
               </a:rPr>
               <a:t>Simulation:</a:t>
             </a:r>
-            <a:endParaRPr lang="en-US" sz="1400" dirty="0" smtClean="0">
-              <a:solidFill>
-                <a:sysClr val="windowText" lastClr="000000"/>
-              </a:solidFill>
-              <a:latin typeface="Times New Roman" pitchFamily="18" charset="0"/>
-              <a:cs typeface="Times New Roman" pitchFamily="18" charset="0"/>
-            </a:endParaRPr>
           </a:p>
           <a:p>
             <a:pPr algn="ctr"/>
@@ -5359,13 +5174,6 @@
               </a:rPr>
               <a:t>Generates flight path contact with simulated objects</a:t>
             </a:r>
-            <a:endParaRPr lang="en-US" sz="1200" i="1" dirty="0" smtClean="0">
-              <a:solidFill>
-                <a:sysClr val="windowText" lastClr="000000"/>
-              </a:solidFill>
-              <a:latin typeface="Times New Roman" pitchFamily="18" charset="0"/>
-              <a:cs typeface="Times New Roman" pitchFamily="18" charset="0"/>
-            </a:endParaRPr>
           </a:p>
         </p:txBody>
       </p:sp>
@@ -5817,13 +5625,6 @@
               </a:rPr>
               <a:t>Initial path</a:t>
             </a:r>
-            <a:endParaRPr lang="en-US" sz="1400" dirty="0" smtClean="0">
-              <a:solidFill>
-                <a:sysClr val="windowText" lastClr="000000"/>
-              </a:solidFill>
-              <a:latin typeface="Times New Roman" pitchFamily="18" charset="0"/>
-              <a:cs typeface="Times New Roman" pitchFamily="18" charset="0"/>
-            </a:endParaRPr>
           </a:p>
         </p:txBody>
       </p:sp>
@@ -5887,13 +5688,6 @@
               </a:rPr>
               <a:t>Assess properties of contacted points</a:t>
             </a:r>
-            <a:endParaRPr lang="en-US" sz="1400" dirty="0" smtClean="0">
-              <a:solidFill>
-                <a:sysClr val="windowText" lastClr="000000"/>
-              </a:solidFill>
-              <a:latin typeface="Times New Roman" pitchFamily="18" charset="0"/>
-              <a:cs typeface="Times New Roman" pitchFamily="18" charset="0"/>
-            </a:endParaRPr>
           </a:p>
         </p:txBody>
       </p:sp>
@@ -5957,13 +5751,6 @@
               </a:rPr>
               <a:t>Tuned path alteration</a:t>
             </a:r>
-            <a:endParaRPr lang="en-US" sz="1400" dirty="0" smtClean="0">
-              <a:solidFill>
-                <a:sysClr val="windowText" lastClr="000000"/>
-              </a:solidFill>
-              <a:latin typeface="Times New Roman" pitchFamily="18" charset="0"/>
-              <a:cs typeface="Times New Roman" pitchFamily="18" charset="0"/>
-            </a:endParaRPr>
           </a:p>
         </p:txBody>
       </p:sp>
@@ -6027,13 +5814,6 @@
               </a:rPr>
               <a:t>Compute the resulting cost  from previous path alteration</a:t>
             </a:r>
-            <a:endParaRPr lang="en-US" sz="1400" dirty="0" smtClean="0">
-              <a:solidFill>
-                <a:sysClr val="windowText" lastClr="000000"/>
-              </a:solidFill>
-              <a:latin typeface="Times New Roman" pitchFamily="18" charset="0"/>
-              <a:cs typeface="Times New Roman" pitchFamily="18" charset="0"/>
-            </a:endParaRPr>
           </a:p>
         </p:txBody>
       </p:sp>
@@ -6097,13 +5877,6 @@
               </a:rPr>
               <a:t>Update tuning parameter vector</a:t>
             </a:r>
-            <a:endParaRPr lang="en-US" sz="1400" dirty="0" smtClean="0">
-              <a:solidFill>
-                <a:sysClr val="windowText" lastClr="000000"/>
-              </a:solidFill>
-              <a:latin typeface="Times New Roman" pitchFamily="18" charset="0"/>
-              <a:cs typeface="Times New Roman" pitchFamily="18" charset="0"/>
-            </a:endParaRPr>
           </a:p>
         </p:txBody>
       </p:sp>

</xml_diff>

<commit_message>
Start re-implementation in paper
</commit_message>
<xml_diff>
--- a/docs/paper/figs/Diagrams.pptx
+++ b/docs/paper/figs/Diagrams.pptx
@@ -292,7 +292,7 @@
             <a:fld id="{1D8BD707-D9CF-40AE-B4C6-C98DA3205C09}" type="datetimeFigureOut">
               <a:rPr lang="en-US" smtClean="0"/>
               <a:pPr/>
-              <a:t>5/5/2019</a:t>
+              <a:t>5/8/2019</a:t>
             </a:fld>
             <a:endParaRPr lang="en-US"/>
           </a:p>
@@ -459,7 +459,7 @@
             <a:fld id="{1D8BD707-D9CF-40AE-B4C6-C98DA3205C09}" type="datetimeFigureOut">
               <a:rPr lang="en-US" smtClean="0"/>
               <a:pPr/>
-              <a:t>5/5/2019</a:t>
+              <a:t>5/8/2019</a:t>
             </a:fld>
             <a:endParaRPr lang="en-US"/>
           </a:p>
@@ -636,7 +636,7 @@
             <a:fld id="{1D8BD707-D9CF-40AE-B4C6-C98DA3205C09}" type="datetimeFigureOut">
               <a:rPr lang="en-US" smtClean="0"/>
               <a:pPr/>
-              <a:t>5/5/2019</a:t>
+              <a:t>5/8/2019</a:t>
             </a:fld>
             <a:endParaRPr lang="en-US"/>
           </a:p>
@@ -803,7 +803,7 @@
             <a:fld id="{1D8BD707-D9CF-40AE-B4C6-C98DA3205C09}" type="datetimeFigureOut">
               <a:rPr lang="en-US" smtClean="0"/>
               <a:pPr/>
-              <a:t>5/5/2019</a:t>
+              <a:t>5/8/2019</a:t>
             </a:fld>
             <a:endParaRPr lang="en-US"/>
           </a:p>
@@ -1046,7 +1046,7 @@
             <a:fld id="{1D8BD707-D9CF-40AE-B4C6-C98DA3205C09}" type="datetimeFigureOut">
               <a:rPr lang="en-US" smtClean="0"/>
               <a:pPr/>
-              <a:t>5/5/2019</a:t>
+              <a:t>5/8/2019</a:t>
             </a:fld>
             <a:endParaRPr lang="en-US"/>
           </a:p>
@@ -1331,7 +1331,7 @@
             <a:fld id="{1D8BD707-D9CF-40AE-B4C6-C98DA3205C09}" type="datetimeFigureOut">
               <a:rPr lang="en-US" smtClean="0"/>
               <a:pPr/>
-              <a:t>5/5/2019</a:t>
+              <a:t>5/8/2019</a:t>
             </a:fld>
             <a:endParaRPr lang="en-US"/>
           </a:p>
@@ -1750,7 +1750,7 @@
             <a:fld id="{1D8BD707-D9CF-40AE-B4C6-C98DA3205C09}" type="datetimeFigureOut">
               <a:rPr lang="en-US" smtClean="0"/>
               <a:pPr/>
-              <a:t>5/5/2019</a:t>
+              <a:t>5/8/2019</a:t>
             </a:fld>
             <a:endParaRPr lang="en-US"/>
           </a:p>
@@ -1865,7 +1865,7 @@
             <a:fld id="{1D8BD707-D9CF-40AE-B4C6-C98DA3205C09}" type="datetimeFigureOut">
               <a:rPr lang="en-US" smtClean="0"/>
               <a:pPr/>
-              <a:t>5/5/2019</a:t>
+              <a:t>5/8/2019</a:t>
             </a:fld>
             <a:endParaRPr lang="en-US"/>
           </a:p>
@@ -1957,7 +1957,7 @@
             <a:fld id="{1D8BD707-D9CF-40AE-B4C6-C98DA3205C09}" type="datetimeFigureOut">
               <a:rPr lang="en-US" smtClean="0"/>
               <a:pPr/>
-              <a:t>5/5/2019</a:t>
+              <a:t>5/8/2019</a:t>
             </a:fld>
             <a:endParaRPr lang="en-US"/>
           </a:p>
@@ -2231,7 +2231,7 @@
             <a:fld id="{1D8BD707-D9CF-40AE-B4C6-C98DA3205C09}" type="datetimeFigureOut">
               <a:rPr lang="en-US" smtClean="0"/>
               <a:pPr/>
-              <a:t>5/5/2019</a:t>
+              <a:t>5/8/2019</a:t>
             </a:fld>
             <a:endParaRPr lang="en-US"/>
           </a:p>
@@ -2481,7 +2481,7 @@
             <a:fld id="{1D8BD707-D9CF-40AE-B4C6-C98DA3205C09}" type="datetimeFigureOut">
               <a:rPr lang="en-US" smtClean="0"/>
               <a:pPr/>
-              <a:t>5/5/2019</a:t>
+              <a:t>5/8/2019</a:t>
             </a:fld>
             <a:endParaRPr lang="en-US"/>
           </a:p>
@@ -2691,7 +2691,7 @@
             <a:fld id="{1D8BD707-D9CF-40AE-B4C6-C98DA3205C09}" type="datetimeFigureOut">
               <a:rPr lang="en-US" smtClean="0"/>
               <a:pPr/>
-              <a:t>5/5/2019</a:t>
+              <a:t>5/8/2019</a:t>
             </a:fld>
             <a:endParaRPr lang="en-US"/>
           </a:p>
@@ -6031,15 +6031,13 @@
       <p:cxnSp>
         <p:nvCxnSpPr>
           <p:cNvPr id="116" name="Straight Arrow Connector 115"/>
-          <p:cNvCxnSpPr>
-            <a:stCxn id="32" idx="7"/>
-          </p:cNvCxnSpPr>
+          <p:cNvCxnSpPr/>
           <p:nvPr/>
         </p:nvCxnSpPr>
         <p:spPr>
-          <a:xfrm flipH="1">
-            <a:off x="6019800" y="2624278"/>
-            <a:ext cx="880922" cy="576122"/>
+          <a:xfrm>
+            <a:off x="6781800" y="2590800"/>
+            <a:ext cx="262078" cy="880922"/>
           </a:xfrm>
           <a:prstGeom prst="straightConnector1">
             <a:avLst/>
@@ -6076,8 +6074,8 @@
         </p:nvCxnSpPr>
         <p:spPr>
           <a:xfrm flipH="1" flipV="1">
-            <a:off x="5943600" y="2438400"/>
-            <a:ext cx="838200" cy="228600"/>
+            <a:off x="6705600" y="2286000"/>
+            <a:ext cx="152400" cy="533400"/>
           </a:xfrm>
           <a:prstGeom prst="straightConnector1">
             <a:avLst/>
@@ -6114,8 +6112,8 @@
         </p:nvCxnSpPr>
         <p:spPr>
           <a:xfrm flipH="1" flipV="1">
-            <a:off x="4038600" y="2286000"/>
-            <a:ext cx="838200" cy="838200"/>
+            <a:off x="4572000" y="2286000"/>
+            <a:ext cx="304800" cy="914400"/>
           </a:xfrm>
           <a:prstGeom prst="straightConnector1">
             <a:avLst/>
@@ -6147,15 +6145,13 @@
       <p:cxnSp>
         <p:nvCxnSpPr>
           <p:cNvPr id="87" name="Straight Arrow Connector 86"/>
-          <p:cNvCxnSpPr>
-            <a:stCxn id="31" idx="0"/>
-          </p:cNvCxnSpPr>
+          <p:cNvCxnSpPr/>
           <p:nvPr/>
         </p:nvCxnSpPr>
         <p:spPr>
-          <a:xfrm flipH="1">
-            <a:off x="4800600" y="2971800"/>
-            <a:ext cx="38100" cy="1524000"/>
+          <a:xfrm>
+            <a:off x="4838700" y="3048000"/>
+            <a:ext cx="419100" cy="1447800"/>
           </a:xfrm>
           <a:prstGeom prst="straightConnector1">
             <a:avLst/>
@@ -6187,15 +6183,13 @@
       <p:cxnSp>
         <p:nvCxnSpPr>
           <p:cNvPr id="84" name="Straight Arrow Connector 83"/>
-          <p:cNvCxnSpPr>
-            <a:stCxn id="29" idx="2"/>
-          </p:cNvCxnSpPr>
+          <p:cNvCxnSpPr/>
           <p:nvPr/>
         </p:nvCxnSpPr>
         <p:spPr>
           <a:xfrm>
-            <a:off x="2819400" y="3467100"/>
-            <a:ext cx="1447800" cy="419100"/>
+            <a:off x="2895600" y="3352800"/>
+            <a:ext cx="304800" cy="1066800"/>
           </a:xfrm>
           <a:prstGeom prst="straightConnector1">
             <a:avLst/>
@@ -6227,15 +6221,13 @@
       <p:cxnSp>
         <p:nvCxnSpPr>
           <p:cNvPr id="80" name="Straight Arrow Connector 79"/>
-          <p:cNvCxnSpPr>
-            <a:stCxn id="30" idx="2"/>
-          </p:cNvCxnSpPr>
+          <p:cNvCxnSpPr/>
           <p:nvPr/>
         </p:nvCxnSpPr>
         <p:spPr>
           <a:xfrm>
-            <a:off x="1066800" y="3848100"/>
-            <a:ext cx="990600" cy="38100"/>
+            <a:off x="1143000" y="3733800"/>
+            <a:ext cx="152400" cy="647700"/>
           </a:xfrm>
           <a:prstGeom prst="straightConnector1">
             <a:avLst/>
@@ -6271,9 +6263,9 @@
           <p:nvPr/>
         </p:nvCxnSpPr>
         <p:spPr>
-          <a:xfrm flipV="1">
-            <a:off x="2895600" y="2438400"/>
-            <a:ext cx="533400" cy="1033322"/>
+          <a:xfrm flipH="1" flipV="1">
+            <a:off x="2514600" y="1981200"/>
+            <a:ext cx="381000" cy="1371600"/>
           </a:xfrm>
           <a:prstGeom prst="straightConnector1">
             <a:avLst/>
@@ -6305,15 +6297,13 @@
       <p:cxnSp>
         <p:nvCxnSpPr>
           <p:cNvPr id="75" name="Straight Arrow Connector 74"/>
-          <p:cNvCxnSpPr>
-            <a:stCxn id="30" idx="3"/>
-          </p:cNvCxnSpPr>
+          <p:cNvCxnSpPr/>
           <p:nvPr/>
         </p:nvCxnSpPr>
         <p:spPr>
-          <a:xfrm flipV="1">
-            <a:off x="1100278" y="3276600"/>
-            <a:ext cx="804722" cy="652322"/>
+          <a:xfrm flipH="1" flipV="1">
+            <a:off x="990600" y="3048000"/>
+            <a:ext cx="185878" cy="804722"/>
           </a:xfrm>
           <a:prstGeom prst="straightConnector1">
             <a:avLst/>
@@ -7071,7 +7061,7 @@
         <p:spPr>
           <a:xfrm>
             <a:off x="3810000" y="1676400"/>
-            <a:ext cx="1371600" cy="276999"/>
+            <a:ext cx="1524000" cy="276999"/>
           </a:xfrm>
           <a:prstGeom prst="rect">
             <a:avLst/>
@@ -7089,7 +7079,14 @@
                 <a:latin typeface="Times New Roman" pitchFamily="18" charset="0"/>
                 <a:cs typeface="Times New Roman" pitchFamily="18" charset="0"/>
               </a:rPr>
-              <a:t>Last seen location</a:t>
+              <a:t>Last seen </a:t>
+            </a:r>
+            <a:r>
+              <a:rPr lang="en-US" sz="1200" dirty="0" smtClean="0">
+                <a:latin typeface="Times New Roman" pitchFamily="18" charset="0"/>
+                <a:cs typeface="Times New Roman" pitchFamily="18" charset="0"/>
+              </a:rPr>
+              <a:t>location</a:t>
             </a:r>
             <a:endParaRPr lang="en-US" sz="1200" dirty="0">
               <a:latin typeface="Times New Roman" pitchFamily="18" charset="0"/>
@@ -7106,7 +7103,7 @@
         </p:nvSpPr>
         <p:spPr>
           <a:xfrm>
-            <a:off x="5029200" y="3810000"/>
+            <a:off x="3886200" y="4114800"/>
             <a:ext cx="1143000" cy="461665"/>
           </a:xfrm>
           <a:prstGeom prst="rect">
@@ -7142,7 +7139,7 @@
         </p:nvSpPr>
         <p:spPr>
           <a:xfrm>
-            <a:off x="533400" y="3429000"/>
+            <a:off x="1447800" y="4038600"/>
             <a:ext cx="914400" cy="276999"/>
           </a:xfrm>
           <a:prstGeom prst="rect">
@@ -7370,8 +7367,8 @@
         </p:nvSpPr>
         <p:spPr>
           <a:xfrm>
-            <a:off x="2590800" y="1447800"/>
-            <a:ext cx="914400" cy="461665"/>
+            <a:off x="2209800" y="1447800"/>
+            <a:ext cx="1295400" cy="276999"/>
           </a:xfrm>
           <a:prstGeom prst="rect">
             <a:avLst/>
@@ -7407,10 +7404,10 @@
         </p:nvGrpSpPr>
         <p:grpSpPr>
           <a:xfrm>
-            <a:off x="5638800" y="1371600"/>
-            <a:ext cx="2057400" cy="762000"/>
+            <a:off x="5562600" y="1295400"/>
+            <a:ext cx="2438400" cy="762000"/>
             <a:chOff x="5943600" y="3352800"/>
-            <a:chExt cx="2057400" cy="762000"/>
+            <a:chExt cx="2414016" cy="762000"/>
           </a:xfrm>
         </p:grpSpPr>
         <p:sp>
@@ -7422,7 +7419,7 @@
           <p:spPr>
             <a:xfrm>
               <a:off x="5943600" y="3352800"/>
-              <a:ext cx="2057400" cy="762000"/>
+              <a:ext cx="2414016" cy="762000"/>
             </a:xfrm>
             <a:prstGeom prst="rect">
               <a:avLst/>

</xml_diff>